<commit_message>
added some about reflection
</commit_message>
<xml_diff>
--- a/slides/07-JavaReflection.pptx
+++ b/slides/07-JavaReflection.pptx
@@ -5,7 +5,7 @@
     <p:sldMasterId id="2147483696" r:id="rId1"/>
   </p:sldMasterIdLst>
   <p:notesMasterIdLst>
-    <p:notesMasterId r:id="rId13"/>
+    <p:notesMasterId r:id="rId16"/>
   </p:notesMasterIdLst>
   <p:sldIdLst>
     <p:sldId id="256" r:id="rId2"/>
@@ -19,6 +19,9 @@
     <p:sldId id="273" r:id="rId10"/>
     <p:sldId id="275" r:id="rId11"/>
     <p:sldId id="276" r:id="rId12"/>
+    <p:sldId id="277" r:id="rId13"/>
+    <p:sldId id="280" r:id="rId14"/>
+    <p:sldId id="278" r:id="rId15"/>
   </p:sldIdLst>
   <p:sldSz cx="12192000" cy="6858000"/>
   <p:notesSz cx="6858000" cy="9144000"/>
@@ -4941,7 +4944,15 @@
           <a:p>
             <a:r>
               <a:rPr lang="en-US" dirty="0"/>
-              <a:t>Reflection</a:t>
+              <a:t>Reflection - </a:t>
+            </a:r>
+            <a:r>
+              <a:rPr lang="en-US" dirty="0">
+                <a:latin typeface="Menlo" panose="020B0609030804020204" pitchFamily="49" charset="0"/>
+                <a:ea typeface="Menlo" panose="020B0609030804020204" pitchFamily="49" charset="0"/>
+                <a:cs typeface="Menlo" panose="020B0609030804020204" pitchFamily="49" charset="0"/>
+              </a:rPr>
+              <a:t>Class</a:t>
             </a:r>
           </a:p>
         </p:txBody>
@@ -4962,12 +4973,294 @@
             <p:ph idx="1"/>
           </p:nvPr>
         </p:nvSpPr>
-        <p:spPr/>
+        <p:spPr>
+          <a:xfrm>
+            <a:off x="1371600" y="1701209"/>
+            <a:ext cx="9601200" cy="4774019"/>
+          </a:xfrm>
+        </p:spPr>
         <p:txBody>
-          <a:bodyPr/>
+          <a:bodyPr>
+            <a:normAutofit fontScale="92500" lnSpcReduction="20000"/>
+          </a:bodyPr>
           <a:lstStyle/>
           <a:p>
-            <a:endParaRPr lang="en-US"/>
+            <a:r>
+              <a:rPr lang="en-US" dirty="0"/>
+              <a:t>You may have already used some:</a:t>
+            </a:r>
+          </a:p>
+          <a:p>
+            <a:pPr lvl="1"/>
+            <a:r>
+              <a:rPr lang="en-US" dirty="0"/>
+              <a:t>in equals(Object o) method, need to check</a:t>
+            </a:r>
+          </a:p>
+          <a:p>
+            <a:pPr lvl="2"/>
+            <a:r>
+              <a:rPr lang="en-US" dirty="0">
+                <a:latin typeface="Menlo" panose="020B0609030804020204" pitchFamily="49" charset="0"/>
+                <a:ea typeface="Menlo" panose="020B0609030804020204" pitchFamily="49" charset="0"/>
+                <a:cs typeface="Menlo" panose="020B0609030804020204" pitchFamily="49" charset="0"/>
+              </a:rPr>
+              <a:t>o </a:t>
+            </a:r>
+            <a:r>
+              <a:rPr lang="en-US" i="1" dirty="0" err="1">
+                <a:latin typeface="Menlo" panose="020B0609030804020204" pitchFamily="49" charset="0"/>
+                <a:ea typeface="Menlo" panose="020B0609030804020204" pitchFamily="49" charset="0"/>
+                <a:cs typeface="Menlo" panose="020B0609030804020204" pitchFamily="49" charset="0"/>
+              </a:rPr>
+              <a:t>instanceof</a:t>
+            </a:r>
+            <a:r>
+              <a:rPr lang="en-US" dirty="0">
+                <a:latin typeface="Menlo" panose="020B0609030804020204" pitchFamily="49" charset="0"/>
+                <a:ea typeface="Menlo" panose="020B0609030804020204" pitchFamily="49" charset="0"/>
+                <a:cs typeface="Menlo" panose="020B0609030804020204" pitchFamily="49" charset="0"/>
+              </a:rPr>
+              <a:t> Class</a:t>
+            </a:r>
+            <a:r>
+              <a:rPr lang="en-US" dirty="0"/>
+              <a:t>, OR</a:t>
+            </a:r>
+          </a:p>
+          <a:p>
+            <a:pPr lvl="2"/>
+            <a:r>
+              <a:rPr lang="en-US" dirty="0" err="1">
+                <a:latin typeface="Menlo" panose="020B0609030804020204" pitchFamily="49" charset="0"/>
+                <a:ea typeface="Menlo" panose="020B0609030804020204" pitchFamily="49" charset="0"/>
+                <a:cs typeface="Menlo" panose="020B0609030804020204" pitchFamily="49" charset="0"/>
+              </a:rPr>
+              <a:t>o.getClass</a:t>
+            </a:r>
+            <a:r>
+              <a:rPr lang="en-US" dirty="0">
+                <a:latin typeface="Menlo" panose="020B0609030804020204" pitchFamily="49" charset="0"/>
+                <a:ea typeface="Menlo" panose="020B0609030804020204" pitchFamily="49" charset="0"/>
+                <a:cs typeface="Menlo" panose="020B0609030804020204" pitchFamily="49" charset="0"/>
+              </a:rPr>
+              <a:t>().equals(</a:t>
+            </a:r>
+            <a:r>
+              <a:rPr lang="en-US" dirty="0" err="1">
+                <a:latin typeface="Menlo" panose="020B0609030804020204" pitchFamily="49" charset="0"/>
+                <a:ea typeface="Menlo" panose="020B0609030804020204" pitchFamily="49" charset="0"/>
+                <a:cs typeface="Menlo" panose="020B0609030804020204" pitchFamily="49" charset="0"/>
+              </a:rPr>
+              <a:t>this.getClass</a:t>
+            </a:r>
+            <a:r>
+              <a:rPr lang="en-US" dirty="0">
+                <a:latin typeface="Menlo" panose="020B0609030804020204" pitchFamily="49" charset="0"/>
+                <a:ea typeface="Menlo" panose="020B0609030804020204" pitchFamily="49" charset="0"/>
+                <a:cs typeface="Menlo" panose="020B0609030804020204" pitchFamily="49" charset="0"/>
+              </a:rPr>
+              <a:t>())</a:t>
+            </a:r>
+          </a:p>
+          <a:p>
+            <a:pPr lvl="1"/>
+            <a:r>
+              <a:rPr lang="en-US" dirty="0">
+                <a:ea typeface="Menlo" panose="020B0609030804020204" pitchFamily="49" charset="0"/>
+                <a:cs typeface="Menlo" panose="020B0609030804020204" pitchFamily="49" charset="0"/>
+              </a:rPr>
+              <a:t>this is reflection</a:t>
+            </a:r>
+          </a:p>
+          <a:p>
+            <a:pPr lvl="2"/>
+            <a:r>
+              <a:rPr lang="en-US" dirty="0">
+                <a:ea typeface="Menlo" panose="020B0609030804020204" pitchFamily="49" charset="0"/>
+                <a:cs typeface="Menlo" panose="020B0609030804020204" pitchFamily="49" charset="0"/>
+              </a:rPr>
+              <a:t>introspecting the type of the Object</a:t>
+            </a:r>
+          </a:p>
+          <a:p>
+            <a:r>
+              <a:rPr lang="en-US" dirty="0">
+                <a:ea typeface="Menlo" panose="020B0609030804020204" pitchFamily="49" charset="0"/>
+                <a:cs typeface="Menlo" panose="020B0609030804020204" pitchFamily="49" charset="0"/>
+              </a:rPr>
+              <a:t>There is more that you can do with the Class class:</a:t>
+            </a:r>
+          </a:p>
+          <a:p>
+            <a:pPr lvl="1"/>
+            <a:r>
+              <a:rPr lang="en-US" dirty="0">
+                <a:ea typeface="Menlo" panose="020B0609030804020204" pitchFamily="49" charset="0"/>
+                <a:cs typeface="Menlo" panose="020B0609030804020204" pitchFamily="49" charset="0"/>
+              </a:rPr>
+              <a:t>We already saw </a:t>
+            </a:r>
+            <a:r>
+              <a:rPr lang="en-US" dirty="0" err="1">
+                <a:latin typeface="Menlo" panose="020B0609030804020204" pitchFamily="49" charset="0"/>
+                <a:ea typeface="Menlo" panose="020B0609030804020204" pitchFamily="49" charset="0"/>
+                <a:cs typeface="Menlo" panose="020B0609030804020204" pitchFamily="49" charset="0"/>
+              </a:rPr>
+              <a:t>getEnclosingMethod</a:t>
+            </a:r>
+            <a:r>
+              <a:rPr lang="en-US" dirty="0">
+                <a:latin typeface="Menlo" panose="020B0609030804020204" pitchFamily="49" charset="0"/>
+                <a:ea typeface="Menlo" panose="020B0609030804020204" pitchFamily="49" charset="0"/>
+                <a:cs typeface="Menlo" panose="020B0609030804020204" pitchFamily="49" charset="0"/>
+              </a:rPr>
+              <a:t>()</a:t>
+            </a:r>
+          </a:p>
+          <a:p>
+            <a:pPr lvl="2"/>
+            <a:r>
+              <a:rPr lang="en-US" dirty="0">
+                <a:ea typeface="Menlo" panose="020B0609030804020204" pitchFamily="49" charset="0"/>
+                <a:cs typeface="Menlo" panose="020B0609030804020204" pitchFamily="49" charset="0"/>
+              </a:rPr>
+              <a:t>if the class has been defined within a method,</a:t>
+            </a:r>
+          </a:p>
+          <a:p>
+            <a:pPr lvl="3"/>
+            <a:r>
+              <a:rPr lang="en-US" dirty="0">
+                <a:ea typeface="Menlo" panose="020B0609030804020204" pitchFamily="49" charset="0"/>
+                <a:cs typeface="Menlo" panose="020B0609030804020204" pitchFamily="49" charset="0"/>
+              </a:rPr>
+              <a:t>will return </a:t>
+            </a:r>
+            <a:r>
+              <a:rPr lang="en-US" dirty="0">
+                <a:latin typeface="Menlo" panose="020B0609030804020204" pitchFamily="49" charset="0"/>
+                <a:ea typeface="Menlo" panose="020B0609030804020204" pitchFamily="49" charset="0"/>
+                <a:cs typeface="Menlo" panose="020B0609030804020204" pitchFamily="49" charset="0"/>
+              </a:rPr>
+              <a:t>Method</a:t>
+            </a:r>
+            <a:r>
+              <a:rPr lang="en-US" dirty="0">
+                <a:ea typeface="Menlo" panose="020B0609030804020204" pitchFamily="49" charset="0"/>
+                <a:cs typeface="Menlo" panose="020B0609030804020204" pitchFamily="49" charset="0"/>
+              </a:rPr>
+              <a:t> object representing that method</a:t>
+            </a:r>
+          </a:p>
+          <a:p>
+            <a:pPr lvl="1"/>
+            <a:r>
+              <a:rPr lang="en-US" dirty="0">
+                <a:ea typeface="Menlo" panose="020B0609030804020204" pitchFamily="49" charset="0"/>
+                <a:cs typeface="Menlo" panose="020B0609030804020204" pitchFamily="49" charset="0"/>
+              </a:rPr>
+              <a:t>There’s also </a:t>
+            </a:r>
+          </a:p>
+          <a:p>
+            <a:pPr lvl="2"/>
+            <a:r>
+              <a:rPr lang="en-US" dirty="0">
+                <a:latin typeface="Menlo" panose="020B0609030804020204" pitchFamily="49" charset="0"/>
+                <a:ea typeface="Menlo" panose="020B0609030804020204" pitchFamily="49" charset="0"/>
+                <a:cs typeface="Menlo" panose="020B0609030804020204" pitchFamily="49" charset="0"/>
+              </a:rPr>
+              <a:t>.</a:t>
+            </a:r>
+            <a:r>
+              <a:rPr lang="en-US" dirty="0" err="1">
+                <a:latin typeface="Menlo" panose="020B0609030804020204" pitchFamily="49" charset="0"/>
+                <a:ea typeface="Menlo" panose="020B0609030804020204" pitchFamily="49" charset="0"/>
+                <a:cs typeface="Menlo" panose="020B0609030804020204" pitchFamily="49" charset="0"/>
+              </a:rPr>
+              <a:t>getConstructors</a:t>
+            </a:r>
+            <a:r>
+              <a:rPr lang="en-US" dirty="0">
+                <a:latin typeface="Menlo" panose="020B0609030804020204" pitchFamily="49" charset="0"/>
+                <a:ea typeface="Menlo" panose="020B0609030804020204" pitchFamily="49" charset="0"/>
+                <a:cs typeface="Menlo" panose="020B0609030804020204" pitchFamily="49" charset="0"/>
+              </a:rPr>
+              <a:t>()</a:t>
+            </a:r>
+          </a:p>
+          <a:p>
+            <a:pPr lvl="2"/>
+            <a:r>
+              <a:rPr lang="en-US" dirty="0">
+                <a:latin typeface="Menlo" panose="020B0609030804020204" pitchFamily="49" charset="0"/>
+                <a:ea typeface="Menlo" panose="020B0609030804020204" pitchFamily="49" charset="0"/>
+                <a:cs typeface="Menlo" panose="020B0609030804020204" pitchFamily="49" charset="0"/>
+              </a:rPr>
+              <a:t>.</a:t>
+            </a:r>
+            <a:r>
+              <a:rPr lang="en-US" dirty="0" err="1">
+                <a:latin typeface="Menlo" panose="020B0609030804020204" pitchFamily="49" charset="0"/>
+                <a:ea typeface="Menlo" panose="020B0609030804020204" pitchFamily="49" charset="0"/>
+                <a:cs typeface="Menlo" panose="020B0609030804020204" pitchFamily="49" charset="0"/>
+              </a:rPr>
+              <a:t>getDeclaredMethods</a:t>
+            </a:r>
+            <a:r>
+              <a:rPr lang="en-US" dirty="0">
+                <a:latin typeface="Menlo" panose="020B0609030804020204" pitchFamily="49" charset="0"/>
+                <a:ea typeface="Menlo" panose="020B0609030804020204" pitchFamily="49" charset="0"/>
+                <a:cs typeface="Menlo" panose="020B0609030804020204" pitchFamily="49" charset="0"/>
+              </a:rPr>
+              <a:t>()</a:t>
+            </a:r>
+          </a:p>
+          <a:p>
+            <a:pPr lvl="2"/>
+            <a:r>
+              <a:rPr lang="en-US" dirty="0">
+                <a:latin typeface="Menlo" panose="020B0609030804020204" pitchFamily="49" charset="0"/>
+                <a:ea typeface="Menlo" panose="020B0609030804020204" pitchFamily="49" charset="0"/>
+                <a:cs typeface="Menlo" panose="020B0609030804020204" pitchFamily="49" charset="0"/>
+              </a:rPr>
+              <a:t>.</a:t>
+            </a:r>
+            <a:r>
+              <a:rPr lang="en-US" dirty="0" err="1">
+                <a:latin typeface="Menlo" panose="020B0609030804020204" pitchFamily="49" charset="0"/>
+                <a:ea typeface="Menlo" panose="020B0609030804020204" pitchFamily="49" charset="0"/>
+                <a:cs typeface="Menlo" panose="020B0609030804020204" pitchFamily="49" charset="0"/>
+              </a:rPr>
+              <a:t>getDeclaredFields</a:t>
+            </a:r>
+            <a:r>
+              <a:rPr lang="en-US" dirty="0">
+                <a:latin typeface="Menlo" panose="020B0609030804020204" pitchFamily="49" charset="0"/>
+                <a:ea typeface="Menlo" panose="020B0609030804020204" pitchFamily="49" charset="0"/>
+                <a:cs typeface="Menlo" panose="020B0609030804020204" pitchFamily="49" charset="0"/>
+              </a:rPr>
+              <a:t>()</a:t>
+            </a:r>
+          </a:p>
+          <a:p>
+            <a:pPr lvl="2"/>
+            <a:r>
+              <a:rPr lang="en-US" dirty="0">
+                <a:latin typeface="Menlo" panose="020B0609030804020204" pitchFamily="49" charset="0"/>
+                <a:ea typeface="Menlo" panose="020B0609030804020204" pitchFamily="49" charset="0"/>
+                <a:cs typeface="Menlo" panose="020B0609030804020204" pitchFamily="49" charset="0"/>
+              </a:rPr>
+              <a:t>etc.</a:t>
+            </a:r>
+          </a:p>
+          <a:p>
+            <a:pPr lvl="1"/>
+            <a:endParaRPr lang="en-US" dirty="0">
+              <a:ea typeface="Menlo" panose="020B0609030804020204" pitchFamily="49" charset="0"/>
+              <a:cs typeface="Menlo" panose="020B0609030804020204" pitchFamily="49" charset="0"/>
+            </a:endParaRPr>
           </a:p>
         </p:txBody>
       </p:sp>
@@ -4975,6 +5268,706 @@
     <p:extLst>
       <p:ext uri="{BB962C8B-B14F-4D97-AF65-F5344CB8AC3E}">
         <p14:creationId xmlns:p14="http://schemas.microsoft.com/office/powerpoint/2010/main" val="1155111498"/>
+      </p:ext>
+    </p:extLst>
+  </p:cSld>
+  <p:clrMapOvr>
+    <a:masterClrMapping/>
+  </p:clrMapOvr>
+</p:sld>
+</file>
+
+<file path=ppt/slides/slide12.xml><?xml version="1.0" encoding="utf-8"?>
+<p:sld xmlns:a="http://schemas.openxmlformats.org/drawingml/2006/main" xmlns:r="http://schemas.openxmlformats.org/officeDocument/2006/relationships" xmlns:p="http://schemas.openxmlformats.org/presentationml/2006/main">
+  <p:cSld>
+    <p:spTree>
+      <p:nvGrpSpPr>
+        <p:cNvPr id="1" name=""/>
+        <p:cNvGrpSpPr/>
+        <p:nvPr/>
+      </p:nvGrpSpPr>
+      <p:grpSpPr>
+        <a:xfrm>
+          <a:off x="0" y="0"/>
+          <a:ext cx="0" cy="0"/>
+          <a:chOff x="0" y="0"/>
+          <a:chExt cx="0" cy="0"/>
+        </a:xfrm>
+      </p:grpSpPr>
+      <p:sp>
+        <p:nvSpPr>
+          <p:cNvPr id="2" name="Title 1">
+            <a:extLst>
+              <a:ext uri="{FF2B5EF4-FFF2-40B4-BE49-F238E27FC236}">
+                <a16:creationId xmlns:a16="http://schemas.microsoft.com/office/drawing/2014/main" id="{B2F98FAA-8EB1-1841-835F-4AAA11CD5E39}"/>
+              </a:ext>
+            </a:extLst>
+          </p:cNvPr>
+          <p:cNvSpPr>
+            <a:spLocks noGrp="1"/>
+          </p:cNvSpPr>
+          <p:nvPr>
+            <p:ph type="title"/>
+          </p:nvPr>
+        </p:nvSpPr>
+        <p:spPr/>
+        <p:txBody>
+          <a:bodyPr/>
+          <a:lstStyle/>
+          <a:p>
+            <a:r>
+              <a:rPr lang="en-US" dirty="0"/>
+              <a:t>Reflection - </a:t>
+            </a:r>
+            <a:r>
+              <a:rPr lang="en-US" dirty="0">
+                <a:latin typeface="Menlo" panose="020B0609030804020204" pitchFamily="49" charset="0"/>
+                <a:ea typeface="Menlo" panose="020B0609030804020204" pitchFamily="49" charset="0"/>
+                <a:cs typeface="Menlo" panose="020B0609030804020204" pitchFamily="49" charset="0"/>
+              </a:rPr>
+              <a:t>Method</a:t>
+            </a:r>
+          </a:p>
+        </p:txBody>
+      </p:sp>
+      <p:sp>
+        <p:nvSpPr>
+          <p:cNvPr id="3" name="Content Placeholder 2">
+            <a:extLst>
+              <a:ext uri="{FF2B5EF4-FFF2-40B4-BE49-F238E27FC236}">
+                <a16:creationId xmlns:a16="http://schemas.microsoft.com/office/drawing/2014/main" id="{A1DFE549-88B5-6E42-8527-EE22EB89C898}"/>
+              </a:ext>
+            </a:extLst>
+          </p:cNvPr>
+          <p:cNvSpPr>
+            <a:spLocks noGrp="1"/>
+          </p:cNvSpPr>
+          <p:nvPr>
+            <p:ph idx="1"/>
+          </p:nvPr>
+        </p:nvSpPr>
+        <p:spPr>
+          <a:xfrm>
+            <a:off x="1371599" y="1701209"/>
+            <a:ext cx="10451805" cy="4774019"/>
+          </a:xfrm>
+        </p:spPr>
+        <p:txBody>
+          <a:bodyPr>
+            <a:normAutofit/>
+          </a:bodyPr>
+          <a:lstStyle/>
+          <a:p>
+            <a:r>
+              <a:rPr lang="en-US" dirty="0"/>
+              <a:t>We just saw that </a:t>
+            </a:r>
+            <a:r>
+              <a:rPr lang="en-US" dirty="0" err="1">
+                <a:latin typeface="Menlo" panose="020B0609030804020204" pitchFamily="49" charset="0"/>
+                <a:ea typeface="Menlo" panose="020B0609030804020204" pitchFamily="49" charset="0"/>
+                <a:cs typeface="Menlo" panose="020B0609030804020204" pitchFamily="49" charset="0"/>
+              </a:rPr>
+              <a:t>Class.getEnclosingMethod</a:t>
+            </a:r>
+            <a:r>
+              <a:rPr lang="en-US" dirty="0">
+                <a:ea typeface="Menlo" panose="020B0609030804020204" pitchFamily="49" charset="0"/>
+                <a:cs typeface="Menlo" panose="020B0609030804020204" pitchFamily="49" charset="0"/>
+              </a:rPr>
+              <a:t> </a:t>
+            </a:r>
+            <a:r>
+              <a:rPr lang="en-US" dirty="0"/>
+              <a:t>returns type </a:t>
+            </a:r>
+            <a:r>
+              <a:rPr lang="en-US" dirty="0">
+                <a:latin typeface="Menlo" panose="020B0609030804020204" pitchFamily="49" charset="0"/>
+                <a:ea typeface="Menlo" panose="020B0609030804020204" pitchFamily="49" charset="0"/>
+                <a:cs typeface="Menlo" panose="020B0609030804020204" pitchFamily="49" charset="0"/>
+              </a:rPr>
+              <a:t>Method</a:t>
+            </a:r>
+          </a:p>
+          <a:p>
+            <a:pPr lvl="1"/>
+            <a:r>
+              <a:rPr lang="en-US" dirty="0" err="1">
+                <a:latin typeface="Menlo" panose="020B0609030804020204" pitchFamily="49" charset="0"/>
+                <a:ea typeface="Menlo" panose="020B0609030804020204" pitchFamily="49" charset="0"/>
+                <a:cs typeface="Menlo" panose="020B0609030804020204" pitchFamily="49" charset="0"/>
+              </a:rPr>
+              <a:t>getDeclaredMethods</a:t>
+            </a:r>
+            <a:r>
+              <a:rPr lang="en-US" dirty="0">
+                <a:latin typeface="Menlo" panose="020B0609030804020204" pitchFamily="49" charset="0"/>
+                <a:ea typeface="Menlo" panose="020B0609030804020204" pitchFamily="49" charset="0"/>
+                <a:cs typeface="Menlo" panose="020B0609030804020204" pitchFamily="49" charset="0"/>
+              </a:rPr>
+              <a:t>() </a:t>
+            </a:r>
+            <a:r>
+              <a:rPr lang="en-US" dirty="0">
+                <a:ea typeface="Menlo" panose="020B0609030804020204" pitchFamily="49" charset="0"/>
+                <a:cs typeface="Menlo" panose="020B0609030804020204" pitchFamily="49" charset="0"/>
+              </a:rPr>
+              <a:t>returns an array of </a:t>
+            </a:r>
+            <a:r>
+              <a:rPr lang="en-US" dirty="0">
+                <a:latin typeface="Menlo" panose="020B0609030804020204" pitchFamily="49" charset="0"/>
+                <a:ea typeface="Menlo" panose="020B0609030804020204" pitchFamily="49" charset="0"/>
+                <a:cs typeface="Menlo" panose="020B0609030804020204" pitchFamily="49" charset="0"/>
+              </a:rPr>
+              <a:t>Method</a:t>
+            </a:r>
+            <a:r>
+              <a:rPr lang="en-US" dirty="0">
+                <a:ea typeface="Menlo" panose="020B0609030804020204" pitchFamily="49" charset="0"/>
+                <a:cs typeface="Menlo" panose="020B0609030804020204" pitchFamily="49" charset="0"/>
+              </a:rPr>
+              <a:t> objects</a:t>
+            </a:r>
+            <a:endParaRPr lang="en-US" dirty="0">
+              <a:latin typeface="Menlo" panose="020B0609030804020204" pitchFamily="49" charset="0"/>
+              <a:ea typeface="Menlo" panose="020B0609030804020204" pitchFamily="49" charset="0"/>
+              <a:cs typeface="Menlo" panose="020B0609030804020204" pitchFamily="49" charset="0"/>
+            </a:endParaRPr>
+          </a:p>
+          <a:p>
+            <a:r>
+              <a:rPr lang="en-US" dirty="0">
+                <a:ea typeface="Menlo" panose="020B0609030804020204" pitchFamily="49" charset="0"/>
+                <a:cs typeface="Menlo" panose="020B0609030804020204" pitchFamily="49" charset="0"/>
+              </a:rPr>
+              <a:t>What can these Method objects do?</a:t>
+            </a:r>
+          </a:p>
+          <a:p>
+            <a:pPr lvl="1"/>
+            <a:r>
+              <a:rPr lang="en-US" dirty="0">
+                <a:ea typeface="Menlo" panose="020B0609030804020204" pitchFamily="49" charset="0"/>
+                <a:cs typeface="Menlo" panose="020B0609030804020204" pitchFamily="49" charset="0"/>
+              </a:rPr>
+              <a:t>already saw </a:t>
+            </a:r>
+            <a:r>
+              <a:rPr lang="en-US" dirty="0" err="1">
+                <a:latin typeface="Menlo" panose="020B0609030804020204" pitchFamily="49" charset="0"/>
+                <a:ea typeface="Menlo" panose="020B0609030804020204" pitchFamily="49" charset="0"/>
+                <a:cs typeface="Menlo" panose="020B0609030804020204" pitchFamily="49" charset="0"/>
+              </a:rPr>
+              <a:t>getAnnotations</a:t>
+            </a:r>
+            <a:r>
+              <a:rPr lang="en-US" dirty="0">
+                <a:latin typeface="Menlo" panose="020B0609030804020204" pitchFamily="49" charset="0"/>
+                <a:ea typeface="Menlo" panose="020B0609030804020204" pitchFamily="49" charset="0"/>
+                <a:cs typeface="Menlo" panose="020B0609030804020204" pitchFamily="49" charset="0"/>
+              </a:rPr>
+              <a:t>()</a:t>
+            </a:r>
+          </a:p>
+          <a:p>
+            <a:pPr lvl="2"/>
+            <a:r>
+              <a:rPr lang="en-US" dirty="0">
+                <a:ea typeface="Menlo" panose="020B0609030804020204" pitchFamily="49" charset="0"/>
+                <a:cs typeface="Menlo" panose="020B0609030804020204" pitchFamily="49" charset="0"/>
+              </a:rPr>
+              <a:t>Almost all reflected entities have this method</a:t>
+            </a:r>
+          </a:p>
+          <a:p>
+            <a:pPr lvl="3"/>
+            <a:r>
+              <a:rPr lang="en-US" dirty="0">
+                <a:ea typeface="Menlo" panose="020B0609030804020204" pitchFamily="49" charset="0"/>
+                <a:cs typeface="Menlo" panose="020B0609030804020204" pitchFamily="49" charset="0"/>
+              </a:rPr>
+              <a:t>most entities can be annotated</a:t>
+            </a:r>
+          </a:p>
+          <a:p>
+            <a:pPr lvl="1"/>
+            <a:r>
+              <a:rPr lang="en-US" dirty="0">
+                <a:ea typeface="Menlo" panose="020B0609030804020204" pitchFamily="49" charset="0"/>
+                <a:cs typeface="Menlo" panose="020B0609030804020204" pitchFamily="49" charset="0"/>
+              </a:rPr>
+              <a:t>There is also:</a:t>
+            </a:r>
+          </a:p>
+          <a:p>
+            <a:pPr lvl="2"/>
+            <a:r>
+              <a:rPr lang="en-US" dirty="0">
+                <a:latin typeface="Menlo" panose="020B0609030804020204" pitchFamily="49" charset="0"/>
+                <a:ea typeface="Menlo" panose="020B0609030804020204" pitchFamily="49" charset="0"/>
+                <a:cs typeface="Menlo" panose="020B0609030804020204" pitchFamily="49" charset="0"/>
+              </a:rPr>
+              <a:t>.invoke(Object </a:t>
+            </a:r>
+            <a:r>
+              <a:rPr lang="en-US" dirty="0" err="1">
+                <a:latin typeface="Menlo" panose="020B0609030804020204" pitchFamily="49" charset="0"/>
+                <a:ea typeface="Menlo" panose="020B0609030804020204" pitchFamily="49" charset="0"/>
+                <a:cs typeface="Menlo" panose="020B0609030804020204" pitchFamily="49" charset="0"/>
+              </a:rPr>
+              <a:t>obj</a:t>
+            </a:r>
+            <a:r>
+              <a:rPr lang="en-US" dirty="0">
+                <a:latin typeface="Menlo" panose="020B0609030804020204" pitchFamily="49" charset="0"/>
+                <a:ea typeface="Menlo" panose="020B0609030804020204" pitchFamily="49" charset="0"/>
+                <a:cs typeface="Menlo" panose="020B0609030804020204" pitchFamily="49" charset="0"/>
+              </a:rPr>
+              <a:t>, </a:t>
+            </a:r>
+            <a:r>
+              <a:rPr lang="en-US" dirty="0" err="1">
+                <a:latin typeface="Menlo" panose="020B0609030804020204" pitchFamily="49" charset="0"/>
+                <a:ea typeface="Menlo" panose="020B0609030804020204" pitchFamily="49" charset="0"/>
+                <a:cs typeface="Menlo" panose="020B0609030804020204" pitchFamily="49" charset="0"/>
+              </a:rPr>
+              <a:t>Obect</a:t>
+            </a:r>
+            <a:r>
+              <a:rPr lang="en-US" dirty="0">
+                <a:latin typeface="Menlo" panose="020B0609030804020204" pitchFamily="49" charset="0"/>
+                <a:ea typeface="Menlo" panose="020B0609030804020204" pitchFamily="49" charset="0"/>
+                <a:cs typeface="Menlo" panose="020B0609030804020204" pitchFamily="49" charset="0"/>
+              </a:rPr>
+              <a:t>[] </a:t>
+            </a:r>
+            <a:r>
+              <a:rPr lang="en-US" dirty="0" err="1">
+                <a:latin typeface="Menlo" panose="020B0609030804020204" pitchFamily="49" charset="0"/>
+                <a:ea typeface="Menlo" panose="020B0609030804020204" pitchFamily="49" charset="0"/>
+                <a:cs typeface="Menlo" panose="020B0609030804020204" pitchFamily="49" charset="0"/>
+              </a:rPr>
+              <a:t>args</a:t>
+            </a:r>
+            <a:r>
+              <a:rPr lang="en-US" dirty="0">
+                <a:latin typeface="Menlo" panose="020B0609030804020204" pitchFamily="49" charset="0"/>
+                <a:ea typeface="Menlo" panose="020B0609030804020204" pitchFamily="49" charset="0"/>
+                <a:cs typeface="Menlo" panose="020B0609030804020204" pitchFamily="49" charset="0"/>
+              </a:rPr>
+              <a:t>)</a:t>
+            </a:r>
+          </a:p>
+          <a:p>
+            <a:pPr lvl="2"/>
+            <a:r>
+              <a:rPr lang="en-US" dirty="0">
+                <a:latin typeface="Menlo" panose="020B0609030804020204" pitchFamily="49" charset="0"/>
+                <a:ea typeface="Menlo" panose="020B0609030804020204" pitchFamily="49" charset="0"/>
+                <a:cs typeface="Menlo" panose="020B0609030804020204" pitchFamily="49" charset="0"/>
+              </a:rPr>
+              <a:t>.</a:t>
+            </a:r>
+            <a:r>
+              <a:rPr lang="en-US" dirty="0" err="1">
+                <a:latin typeface="Menlo" panose="020B0609030804020204" pitchFamily="49" charset="0"/>
+                <a:ea typeface="Menlo" panose="020B0609030804020204" pitchFamily="49" charset="0"/>
+                <a:cs typeface="Menlo" panose="020B0609030804020204" pitchFamily="49" charset="0"/>
+              </a:rPr>
+              <a:t>getParameterTypes</a:t>
+            </a:r>
+            <a:r>
+              <a:rPr lang="en-US" dirty="0">
+                <a:latin typeface="Menlo" panose="020B0609030804020204" pitchFamily="49" charset="0"/>
+                <a:ea typeface="Menlo" panose="020B0609030804020204" pitchFamily="49" charset="0"/>
+                <a:cs typeface="Menlo" panose="020B0609030804020204" pitchFamily="49" charset="0"/>
+              </a:rPr>
+              <a:t>()</a:t>
+            </a:r>
+          </a:p>
+          <a:p>
+            <a:pPr lvl="2"/>
+            <a:r>
+              <a:rPr lang="en-US" dirty="0">
+                <a:latin typeface="Menlo" panose="020B0609030804020204" pitchFamily="49" charset="0"/>
+                <a:ea typeface="Menlo" panose="020B0609030804020204" pitchFamily="49" charset="0"/>
+                <a:cs typeface="Menlo" panose="020B0609030804020204" pitchFamily="49" charset="0"/>
+              </a:rPr>
+              <a:t>.</a:t>
+            </a:r>
+            <a:r>
+              <a:rPr lang="en-US" dirty="0" err="1">
+                <a:latin typeface="Menlo" panose="020B0609030804020204" pitchFamily="49" charset="0"/>
+                <a:ea typeface="Menlo" panose="020B0609030804020204" pitchFamily="49" charset="0"/>
+                <a:cs typeface="Menlo" panose="020B0609030804020204" pitchFamily="49" charset="0"/>
+              </a:rPr>
+              <a:t>isAccessible</a:t>
+            </a:r>
+            <a:r>
+              <a:rPr lang="en-US" dirty="0">
+                <a:latin typeface="Menlo" panose="020B0609030804020204" pitchFamily="49" charset="0"/>
+                <a:ea typeface="Menlo" panose="020B0609030804020204" pitchFamily="49" charset="0"/>
+                <a:cs typeface="Menlo" panose="020B0609030804020204" pitchFamily="49" charset="0"/>
+              </a:rPr>
+              <a:t>()</a:t>
+            </a:r>
+          </a:p>
+          <a:p>
+            <a:pPr lvl="2"/>
+            <a:r>
+              <a:rPr lang="en-US" dirty="0">
+                <a:latin typeface="Menlo" panose="020B0609030804020204" pitchFamily="49" charset="0"/>
+                <a:ea typeface="Menlo" panose="020B0609030804020204" pitchFamily="49" charset="0"/>
+                <a:cs typeface="Menlo" panose="020B0609030804020204" pitchFamily="49" charset="0"/>
+              </a:rPr>
+              <a:t>.</a:t>
+            </a:r>
+            <a:r>
+              <a:rPr lang="en-US" dirty="0" err="1">
+                <a:latin typeface="Menlo" panose="020B0609030804020204" pitchFamily="49" charset="0"/>
+                <a:ea typeface="Menlo" panose="020B0609030804020204" pitchFamily="49" charset="0"/>
+                <a:cs typeface="Menlo" panose="020B0609030804020204" pitchFamily="49" charset="0"/>
+              </a:rPr>
+              <a:t>setAccessible</a:t>
+            </a:r>
+            <a:r>
+              <a:rPr lang="en-US" dirty="0">
+                <a:latin typeface="Menlo" panose="020B0609030804020204" pitchFamily="49" charset="0"/>
+                <a:ea typeface="Menlo" panose="020B0609030804020204" pitchFamily="49" charset="0"/>
+                <a:cs typeface="Menlo" panose="020B0609030804020204" pitchFamily="49" charset="0"/>
+              </a:rPr>
+              <a:t>(</a:t>
+            </a:r>
+            <a:r>
+              <a:rPr lang="en-US" dirty="0" err="1">
+                <a:latin typeface="Menlo" panose="020B0609030804020204" pitchFamily="49" charset="0"/>
+                <a:ea typeface="Menlo" panose="020B0609030804020204" pitchFamily="49" charset="0"/>
+                <a:cs typeface="Menlo" panose="020B0609030804020204" pitchFamily="49" charset="0"/>
+              </a:rPr>
+              <a:t>boolean</a:t>
+            </a:r>
+            <a:r>
+              <a:rPr lang="en-US" dirty="0">
+                <a:latin typeface="Menlo" panose="020B0609030804020204" pitchFamily="49" charset="0"/>
+                <a:ea typeface="Menlo" panose="020B0609030804020204" pitchFamily="49" charset="0"/>
+                <a:cs typeface="Menlo" panose="020B0609030804020204" pitchFamily="49" charset="0"/>
+              </a:rPr>
+              <a:t> flag) // might be useful for the homework</a:t>
+            </a:r>
+          </a:p>
+        </p:txBody>
+      </p:sp>
+    </p:spTree>
+    <p:extLst>
+      <p:ext uri="{BB962C8B-B14F-4D97-AF65-F5344CB8AC3E}">
+        <p14:creationId xmlns:p14="http://schemas.microsoft.com/office/powerpoint/2010/main" val="3643058450"/>
+      </p:ext>
+    </p:extLst>
+  </p:cSld>
+  <p:clrMapOvr>
+    <a:masterClrMapping/>
+  </p:clrMapOvr>
+</p:sld>
+</file>
+
+<file path=ppt/slides/slide13.xml><?xml version="1.0" encoding="utf-8"?>
+<p:sld xmlns:a="http://schemas.openxmlformats.org/drawingml/2006/main" xmlns:r="http://schemas.openxmlformats.org/officeDocument/2006/relationships" xmlns:p="http://schemas.openxmlformats.org/presentationml/2006/main">
+  <p:cSld>
+    <p:spTree>
+      <p:nvGrpSpPr>
+        <p:cNvPr id="1" name=""/>
+        <p:cNvGrpSpPr/>
+        <p:nvPr/>
+      </p:nvGrpSpPr>
+      <p:grpSpPr>
+        <a:xfrm>
+          <a:off x="0" y="0"/>
+          <a:ext cx="0" cy="0"/>
+          <a:chOff x="0" y="0"/>
+          <a:chExt cx="0" cy="0"/>
+        </a:xfrm>
+      </p:grpSpPr>
+      <p:sp>
+        <p:nvSpPr>
+          <p:cNvPr id="2" name="Title 1">
+            <a:extLst>
+              <a:ext uri="{FF2B5EF4-FFF2-40B4-BE49-F238E27FC236}">
+                <a16:creationId xmlns:a16="http://schemas.microsoft.com/office/drawing/2014/main" id="{259BAC12-E42B-1041-9F5A-18F5A7123384}"/>
+              </a:ext>
+            </a:extLst>
+          </p:cNvPr>
+          <p:cNvSpPr>
+            <a:spLocks noGrp="1"/>
+          </p:cNvSpPr>
+          <p:nvPr>
+            <p:ph type="title"/>
+          </p:nvPr>
+        </p:nvSpPr>
+        <p:spPr/>
+        <p:txBody>
+          <a:bodyPr/>
+          <a:lstStyle/>
+          <a:p>
+            <a:r>
+              <a:rPr lang="en-US" dirty="0"/>
+              <a:t>Java Reflection Limitations</a:t>
+            </a:r>
+          </a:p>
+        </p:txBody>
+      </p:sp>
+      <p:sp>
+        <p:nvSpPr>
+          <p:cNvPr id="3" name="Content Placeholder 2">
+            <a:extLst>
+              <a:ext uri="{FF2B5EF4-FFF2-40B4-BE49-F238E27FC236}">
+                <a16:creationId xmlns:a16="http://schemas.microsoft.com/office/drawing/2014/main" id="{F85CBF8E-453C-804A-BF2E-55B1A46ED7F3}"/>
+              </a:ext>
+            </a:extLst>
+          </p:cNvPr>
+          <p:cNvSpPr>
+            <a:spLocks noGrp="1"/>
+          </p:cNvSpPr>
+          <p:nvPr>
+            <p:ph idx="1"/>
+          </p:nvPr>
+        </p:nvSpPr>
+        <p:spPr/>
+        <p:txBody>
+          <a:bodyPr/>
+          <a:lstStyle/>
+          <a:p>
+            <a:endParaRPr lang="en-US"/>
+          </a:p>
+        </p:txBody>
+      </p:sp>
+    </p:spTree>
+    <p:extLst>
+      <p:ext uri="{BB962C8B-B14F-4D97-AF65-F5344CB8AC3E}">
+        <p14:creationId xmlns:p14="http://schemas.microsoft.com/office/powerpoint/2010/main" val="1002669990"/>
+      </p:ext>
+    </p:extLst>
+  </p:cSld>
+  <p:clrMapOvr>
+    <a:masterClrMapping/>
+  </p:clrMapOvr>
+</p:sld>
+</file>
+
+<file path=ppt/slides/slide14.xml><?xml version="1.0" encoding="utf-8"?>
+<p:sld xmlns:a="http://schemas.openxmlformats.org/drawingml/2006/main" xmlns:r="http://schemas.openxmlformats.org/officeDocument/2006/relationships" xmlns:p="http://schemas.openxmlformats.org/presentationml/2006/main">
+  <p:cSld>
+    <p:spTree>
+      <p:nvGrpSpPr>
+        <p:cNvPr id="1" name=""/>
+        <p:cNvGrpSpPr/>
+        <p:nvPr/>
+      </p:nvGrpSpPr>
+      <p:grpSpPr>
+        <a:xfrm>
+          <a:off x="0" y="0"/>
+          <a:ext cx="0" cy="0"/>
+          <a:chOff x="0" y="0"/>
+          <a:chExt cx="0" cy="0"/>
+        </a:xfrm>
+      </p:grpSpPr>
+      <p:sp>
+        <p:nvSpPr>
+          <p:cNvPr id="2" name="Title 1">
+            <a:extLst>
+              <a:ext uri="{FF2B5EF4-FFF2-40B4-BE49-F238E27FC236}">
+                <a16:creationId xmlns:a16="http://schemas.microsoft.com/office/drawing/2014/main" id="{58904CE9-C89A-4D4D-9612-D1D45DC415A7}"/>
+              </a:ext>
+            </a:extLst>
+          </p:cNvPr>
+          <p:cNvSpPr>
+            <a:spLocks noGrp="1"/>
+          </p:cNvSpPr>
+          <p:nvPr>
+            <p:ph type="title"/>
+          </p:nvPr>
+        </p:nvSpPr>
+        <p:spPr>
+          <a:xfrm>
+            <a:off x="1020726" y="451884"/>
+            <a:ext cx="9601200" cy="1485900"/>
+          </a:xfrm>
+        </p:spPr>
+        <p:txBody>
+          <a:bodyPr/>
+          <a:lstStyle/>
+          <a:p>
+            <a:r>
+              <a:rPr lang="en-US" dirty="0"/>
+              <a:t>Reflection and Annotations</a:t>
+            </a:r>
+          </a:p>
+        </p:txBody>
+      </p:sp>
+      <p:sp>
+        <p:nvSpPr>
+          <p:cNvPr id="3" name="Content Placeholder 2">
+            <a:extLst>
+              <a:ext uri="{FF2B5EF4-FFF2-40B4-BE49-F238E27FC236}">
+                <a16:creationId xmlns:a16="http://schemas.microsoft.com/office/drawing/2014/main" id="{2723039B-1359-1E43-A5EB-C3C10765C033}"/>
+              </a:ext>
+            </a:extLst>
+          </p:cNvPr>
+          <p:cNvSpPr>
+            <a:spLocks noGrp="1"/>
+          </p:cNvSpPr>
+          <p:nvPr>
+            <p:ph idx="1"/>
+          </p:nvPr>
+        </p:nvSpPr>
+        <p:spPr>
+          <a:xfrm>
+            <a:off x="1371600" y="1286540"/>
+            <a:ext cx="9601200" cy="5284381"/>
+          </a:xfrm>
+        </p:spPr>
+        <p:txBody>
+          <a:bodyPr>
+            <a:normAutofit/>
+          </a:bodyPr>
+          <a:lstStyle/>
+          <a:p>
+            <a:r>
+              <a:rPr lang="en-US" dirty="0"/>
+              <a:t>Reflection and Annotations go “hand in hand”</a:t>
+            </a:r>
+          </a:p>
+          <a:p>
+            <a:pPr lvl="1"/>
+            <a:r>
+              <a:rPr lang="en-US" dirty="0"/>
+              <a:t>The only way to tell if something is annotated…</a:t>
+            </a:r>
+          </a:p>
+          <a:p>
+            <a:pPr lvl="2"/>
+            <a:r>
+              <a:rPr lang="en-US" dirty="0"/>
+              <a:t>is with reflection,</a:t>
+            </a:r>
+          </a:p>
+          <a:p>
+            <a:pPr lvl="3"/>
+            <a:r>
+              <a:rPr lang="en-US" dirty="0"/>
+              <a:t>since annotations can’t have any effect on behavior by themselves</a:t>
+            </a:r>
+          </a:p>
+          <a:p>
+            <a:pPr lvl="1"/>
+            <a:r>
+              <a:rPr lang="en-US" dirty="0"/>
+              <a:t>We can build reflective </a:t>
+            </a:r>
+            <a:r>
+              <a:rPr lang="en-US" dirty="0">
+                <a:solidFill>
+                  <a:schemeClr val="accent6"/>
+                </a:solidFill>
+              </a:rPr>
+              <a:t>meta-tools</a:t>
+            </a:r>
+            <a:r>
+              <a:rPr lang="en-US" dirty="0"/>
+              <a:t>…</a:t>
+            </a:r>
+          </a:p>
+          <a:p>
+            <a:pPr lvl="2"/>
+            <a:r>
+              <a:rPr lang="en-US" dirty="0"/>
+              <a:t>that operate based on the annotated </a:t>
+            </a:r>
+            <a:r>
+              <a:rPr lang="en-US" dirty="0">
+                <a:solidFill>
+                  <a:schemeClr val="accent6"/>
+                </a:solidFill>
+              </a:rPr>
+              <a:t>meta-data</a:t>
+            </a:r>
+          </a:p>
+          <a:p>
+            <a:r>
+              <a:rPr lang="en-US" dirty="0"/>
+              <a:t>Example:</a:t>
+            </a:r>
+          </a:p>
+          <a:p>
+            <a:pPr lvl="1"/>
+            <a:r>
+              <a:rPr lang="en-US" dirty="0"/>
+              <a:t>The @Test annotation</a:t>
+            </a:r>
+          </a:p>
+          <a:p>
+            <a:pPr lvl="2"/>
+            <a:r>
+              <a:rPr lang="en-US" dirty="0"/>
+              <a:t>nothing but a flag to the JUnit framework.</a:t>
+            </a:r>
+          </a:p>
+          <a:p>
+            <a:pPr lvl="2"/>
+            <a:r>
+              <a:rPr lang="en-US" dirty="0"/>
+              <a:t>JUnit reflectively searches for the @Test annotation</a:t>
+            </a:r>
+          </a:p>
+          <a:p>
+            <a:pPr lvl="2"/>
+            <a:r>
+              <a:rPr lang="en-US" dirty="0"/>
+              <a:t>and </a:t>
+            </a:r>
+            <a:r>
+              <a:rPr lang="en-US" dirty="0">
+                <a:latin typeface="Menlo" panose="020B0609030804020204" pitchFamily="49" charset="0"/>
+                <a:ea typeface="Menlo" panose="020B0609030804020204" pitchFamily="49" charset="0"/>
+                <a:cs typeface="Menlo" panose="020B0609030804020204" pitchFamily="49" charset="0"/>
+              </a:rPr>
+              <a:t>.</a:t>
+            </a:r>
+            <a:r>
+              <a:rPr lang="en-US" dirty="0" err="1">
+                <a:latin typeface="Menlo" panose="020B0609030804020204" pitchFamily="49" charset="0"/>
+                <a:ea typeface="Menlo" panose="020B0609030804020204" pitchFamily="49" charset="0"/>
+                <a:cs typeface="Menlo" panose="020B0609030804020204" pitchFamily="49" charset="0"/>
+              </a:rPr>
+              <a:t>invoks</a:t>
+            </a:r>
+            <a:r>
+              <a:rPr lang="en-US" dirty="0">
+                <a:latin typeface="Menlo" panose="020B0609030804020204" pitchFamily="49" charset="0"/>
+                <a:ea typeface="Menlo" panose="020B0609030804020204" pitchFamily="49" charset="0"/>
+                <a:cs typeface="Menlo" panose="020B0609030804020204" pitchFamily="49" charset="0"/>
+              </a:rPr>
+              <a:t>(…)</a:t>
+            </a:r>
+            <a:r>
+              <a:rPr lang="en-US" dirty="0"/>
+              <a:t>s the method as a test case</a:t>
+            </a:r>
+          </a:p>
+          <a:p>
+            <a:pPr lvl="1"/>
+            <a:r>
+              <a:rPr lang="en-US" dirty="0"/>
+              <a:t>%%%TODO Make up example</a:t>
+            </a:r>
+          </a:p>
+        </p:txBody>
+      </p:sp>
+    </p:spTree>
+    <p:extLst>
+      <p:ext uri="{BB962C8B-B14F-4D97-AF65-F5344CB8AC3E}">
+        <p14:creationId xmlns:p14="http://schemas.microsoft.com/office/powerpoint/2010/main" val="2731152572"/>
       </p:ext>
     </p:extLst>
   </p:cSld>

</xml_diff>